<commit_message>
FFT Benchmark: update figures
</commit_message>
<xml_diff>
--- a/2016-09-13 Compare FFT Speed/Figures.pptx
+++ b/2016-09-13 Compare FFT Speed/Figures.pptx
@@ -296,7 +296,7 @@
           <a:p>
             <a:fld id="{416C9C19-CFF4-4FAE-9690-4F73D1444028}" type="datetimeFigureOut">
               <a:rPr lang="en-US" smtClean="0"/>
-              <a:t>9/12/2016</a:t>
+              <a:t>9/14/2016</a:t>
             </a:fld>
             <a:endParaRPr lang="en-US"/>
           </a:p>
@@ -466,7 +466,7 @@
           <a:p>
             <a:fld id="{416C9C19-CFF4-4FAE-9690-4F73D1444028}" type="datetimeFigureOut">
               <a:rPr lang="en-US" smtClean="0"/>
-              <a:t>9/12/2016</a:t>
+              <a:t>9/14/2016</a:t>
             </a:fld>
             <a:endParaRPr lang="en-US"/>
           </a:p>
@@ -646,7 +646,7 @@
           <a:p>
             <a:fld id="{416C9C19-CFF4-4FAE-9690-4F73D1444028}" type="datetimeFigureOut">
               <a:rPr lang="en-US" smtClean="0"/>
-              <a:t>9/12/2016</a:t>
+              <a:t>9/14/2016</a:t>
             </a:fld>
             <a:endParaRPr lang="en-US"/>
           </a:p>
@@ -816,7 +816,7 @@
           <a:p>
             <a:fld id="{416C9C19-CFF4-4FAE-9690-4F73D1444028}" type="datetimeFigureOut">
               <a:rPr lang="en-US" smtClean="0"/>
-              <a:t>9/12/2016</a:t>
+              <a:t>9/14/2016</a:t>
             </a:fld>
             <a:endParaRPr lang="en-US"/>
           </a:p>
@@ -1062,7 +1062,7 @@
           <a:p>
             <a:fld id="{416C9C19-CFF4-4FAE-9690-4F73D1444028}" type="datetimeFigureOut">
               <a:rPr lang="en-US" smtClean="0"/>
-              <a:t>9/12/2016</a:t>
+              <a:t>9/14/2016</a:t>
             </a:fld>
             <a:endParaRPr lang="en-US"/>
           </a:p>
@@ -1350,7 +1350,7 @@
           <a:p>
             <a:fld id="{416C9C19-CFF4-4FAE-9690-4F73D1444028}" type="datetimeFigureOut">
               <a:rPr lang="en-US" smtClean="0"/>
-              <a:t>9/12/2016</a:t>
+              <a:t>9/14/2016</a:t>
             </a:fld>
             <a:endParaRPr lang="en-US"/>
           </a:p>
@@ -1772,7 +1772,7 @@
           <a:p>
             <a:fld id="{416C9C19-CFF4-4FAE-9690-4F73D1444028}" type="datetimeFigureOut">
               <a:rPr lang="en-US" smtClean="0"/>
-              <a:t>9/12/2016</a:t>
+              <a:t>9/14/2016</a:t>
             </a:fld>
             <a:endParaRPr lang="en-US"/>
           </a:p>
@@ -1890,7 +1890,7 @@
           <a:p>
             <a:fld id="{416C9C19-CFF4-4FAE-9690-4F73D1444028}" type="datetimeFigureOut">
               <a:rPr lang="en-US" smtClean="0"/>
-              <a:t>9/12/2016</a:t>
+              <a:t>9/14/2016</a:t>
             </a:fld>
             <a:endParaRPr lang="en-US"/>
           </a:p>
@@ -1985,7 +1985,7 @@
           <a:p>
             <a:fld id="{416C9C19-CFF4-4FAE-9690-4F73D1444028}" type="datetimeFigureOut">
               <a:rPr lang="en-US" smtClean="0"/>
-              <a:t>9/12/2016</a:t>
+              <a:t>9/14/2016</a:t>
             </a:fld>
             <a:endParaRPr lang="en-US"/>
           </a:p>
@@ -2262,7 +2262,7 @@
           <a:p>
             <a:fld id="{416C9C19-CFF4-4FAE-9690-4F73D1444028}" type="datetimeFigureOut">
               <a:rPr lang="en-US" smtClean="0"/>
-              <a:t>9/12/2016</a:t>
+              <a:t>9/14/2016</a:t>
             </a:fld>
             <a:endParaRPr lang="en-US"/>
           </a:p>
@@ -2515,7 +2515,7 @@
           <a:p>
             <a:fld id="{416C9C19-CFF4-4FAE-9690-4F73D1444028}" type="datetimeFigureOut">
               <a:rPr lang="en-US" smtClean="0"/>
-              <a:t>9/12/2016</a:t>
+              <a:t>9/14/2016</a:t>
             </a:fld>
             <a:endParaRPr lang="en-US"/>
           </a:p>
@@ -2728,7 +2728,7 @@
           <a:p>
             <a:fld id="{416C9C19-CFF4-4FAE-9690-4F73D1444028}" type="datetimeFigureOut">
               <a:rPr lang="en-US" smtClean="0"/>
-              <a:t>9/12/2016</a:t>
+              <a:t>9/14/2016</a:t>
             </a:fld>
             <a:endParaRPr lang="en-US"/>
           </a:p>
@@ -18448,7 +18448,7 @@
       </p:grpSpPr>
       <p:pic>
         <p:nvPicPr>
-          <p:cNvPr id="2052" name="Picture 4"/>
+          <p:cNvPr id="1026" name="Picture 2"/>
           <p:cNvPicPr>
             <a:picLocks noChangeAspect="1" noChangeArrowheads="1"/>
           </p:cNvPicPr>
@@ -18469,8 +18469,8 @@
         </p:blipFill>
         <p:spPr bwMode="auto">
           <a:xfrm>
-            <a:off x="1676400" y="1447800"/>
-            <a:ext cx="5486400" cy="3230563"/>
+            <a:off x="1371600" y="2743200"/>
+            <a:ext cx="5486400" cy="3230562"/>
           </a:xfrm>
           <a:prstGeom prst="rect">
             <a:avLst/>

</xml_diff>